<commit_message>
atualização do layout da placa
</commit_message>
<xml_diff>
--- a/Producao/Combate_1kg/Relatorio_combate_1,36kg.pptx
+++ b/Producao/Combate_1kg/Relatorio_combate_1,36kg.pptx
@@ -10,9 +10,7 @@
     <p:sldId id="263" r:id="rId4"/>
     <p:sldId id="264" r:id="rId5"/>
     <p:sldId id="265" r:id="rId6"/>
-    <p:sldId id="266" r:id="rId7"/>
-    <p:sldId id="269" r:id="rId8"/>
-    <p:sldId id="267" r:id="rId9"/>
+    <p:sldId id="267" r:id="rId7"/>
   </p:sldIdLst>
   <p:sldSz cx="12192000" cy="6858000"/>
   <p:notesSz cx="6858000" cy="9144000"/>
@@ -113,7 +111,7 @@
   </p:defaultTextStyle>
   <p:extLst>
     <p:ext uri="{EFAFB233-063F-42B5-8137-9DF3F51BA10A}">
-      <p15:sldGuideLst xmlns="" xmlns:p15="http://schemas.microsoft.com/office/powerpoint/2012/main"/>
+      <p15:sldGuideLst xmlns:p15="http://schemas.microsoft.com/office/powerpoint/2012/main" xmlns=""/>
     </p:ext>
   </p:extLst>
 </p:presentation>
@@ -251,7 +249,7 @@
             <a:fld id="{350D53EE-327D-4A72-B4C2-A5BEA245225D}" type="datetimeFigureOut">
               <a:rPr lang="pt-BR" smtClean="0"/>
               <a:pPr/>
-              <a:t>16/10/2017</a:t>
+              <a:t>13/11/2017</a:t>
             </a:fld>
             <a:endParaRPr lang="pt-BR"/>
           </a:p>
@@ -303,7 +301,7 @@
     </p:spTree>
     <p:extLst>
       <p:ext uri="{BB962C8B-B14F-4D97-AF65-F5344CB8AC3E}">
-        <p14:creationId xmlns="" xmlns:p14="http://schemas.microsoft.com/office/powerpoint/2010/main" val="4156219845"/>
+        <p14:creationId xmlns:p14="http://schemas.microsoft.com/office/powerpoint/2010/main" xmlns="" val="4156219845"/>
       </p:ext>
     </p:extLst>
   </p:cSld>
@@ -423,7 +421,7 @@
             <a:fld id="{350D53EE-327D-4A72-B4C2-A5BEA245225D}" type="datetimeFigureOut">
               <a:rPr lang="pt-BR" smtClean="0"/>
               <a:pPr/>
-              <a:t>16/10/2017</a:t>
+              <a:t>13/11/2017</a:t>
             </a:fld>
             <a:endParaRPr lang="pt-BR"/>
           </a:p>
@@ -475,7 +473,7 @@
     </p:spTree>
     <p:extLst>
       <p:ext uri="{BB962C8B-B14F-4D97-AF65-F5344CB8AC3E}">
-        <p14:creationId xmlns="" xmlns:p14="http://schemas.microsoft.com/office/powerpoint/2010/main" val="2857295028"/>
+        <p14:creationId xmlns:p14="http://schemas.microsoft.com/office/powerpoint/2010/main" xmlns="" val="2857295028"/>
       </p:ext>
     </p:extLst>
   </p:cSld>
@@ -605,7 +603,7 @@
             <a:fld id="{350D53EE-327D-4A72-B4C2-A5BEA245225D}" type="datetimeFigureOut">
               <a:rPr lang="pt-BR" smtClean="0"/>
               <a:pPr/>
-              <a:t>16/10/2017</a:t>
+              <a:t>13/11/2017</a:t>
             </a:fld>
             <a:endParaRPr lang="pt-BR"/>
           </a:p>
@@ -657,7 +655,7 @@
     </p:spTree>
     <p:extLst>
       <p:ext uri="{BB962C8B-B14F-4D97-AF65-F5344CB8AC3E}">
-        <p14:creationId xmlns="" xmlns:p14="http://schemas.microsoft.com/office/powerpoint/2010/main" val="365289963"/>
+        <p14:creationId xmlns:p14="http://schemas.microsoft.com/office/powerpoint/2010/main" xmlns="" val="365289963"/>
       </p:ext>
     </p:extLst>
   </p:cSld>
@@ -777,7 +775,7 @@
             <a:fld id="{350D53EE-327D-4A72-B4C2-A5BEA245225D}" type="datetimeFigureOut">
               <a:rPr lang="pt-BR" smtClean="0"/>
               <a:pPr/>
-              <a:t>16/10/2017</a:t>
+              <a:t>13/11/2017</a:t>
             </a:fld>
             <a:endParaRPr lang="pt-BR"/>
           </a:p>
@@ -829,7 +827,7 @@
     </p:spTree>
     <p:extLst>
       <p:ext uri="{BB962C8B-B14F-4D97-AF65-F5344CB8AC3E}">
-        <p14:creationId xmlns="" xmlns:p14="http://schemas.microsoft.com/office/powerpoint/2010/main" val="2049019943"/>
+        <p14:creationId xmlns:p14="http://schemas.microsoft.com/office/powerpoint/2010/main" xmlns="" val="2049019943"/>
       </p:ext>
     </p:extLst>
   </p:cSld>
@@ -1025,7 +1023,7 @@
             <a:fld id="{350D53EE-327D-4A72-B4C2-A5BEA245225D}" type="datetimeFigureOut">
               <a:rPr lang="pt-BR" smtClean="0"/>
               <a:pPr/>
-              <a:t>16/10/2017</a:t>
+              <a:t>13/11/2017</a:t>
             </a:fld>
             <a:endParaRPr lang="pt-BR"/>
           </a:p>
@@ -1077,7 +1075,7 @@
     </p:spTree>
     <p:extLst>
       <p:ext uri="{BB962C8B-B14F-4D97-AF65-F5344CB8AC3E}">
-        <p14:creationId xmlns="" xmlns:p14="http://schemas.microsoft.com/office/powerpoint/2010/main" val="684096545"/>
+        <p14:creationId xmlns:p14="http://schemas.microsoft.com/office/powerpoint/2010/main" xmlns="" val="684096545"/>
       </p:ext>
     </p:extLst>
   </p:cSld>
@@ -1259,7 +1257,7 @@
             <a:fld id="{350D53EE-327D-4A72-B4C2-A5BEA245225D}" type="datetimeFigureOut">
               <a:rPr lang="pt-BR" smtClean="0"/>
               <a:pPr/>
-              <a:t>16/10/2017</a:t>
+              <a:t>13/11/2017</a:t>
             </a:fld>
             <a:endParaRPr lang="pt-BR"/>
           </a:p>
@@ -1311,7 +1309,7 @@
     </p:spTree>
     <p:extLst>
       <p:ext uri="{BB962C8B-B14F-4D97-AF65-F5344CB8AC3E}">
-        <p14:creationId xmlns="" xmlns:p14="http://schemas.microsoft.com/office/powerpoint/2010/main" val="1654294801"/>
+        <p14:creationId xmlns:p14="http://schemas.microsoft.com/office/powerpoint/2010/main" xmlns="" val="1654294801"/>
       </p:ext>
     </p:extLst>
   </p:cSld>
@@ -1628,7 +1626,7 @@
             <a:fld id="{350D53EE-327D-4A72-B4C2-A5BEA245225D}" type="datetimeFigureOut">
               <a:rPr lang="pt-BR" smtClean="0"/>
               <a:pPr/>
-              <a:t>16/10/2017</a:t>
+              <a:t>13/11/2017</a:t>
             </a:fld>
             <a:endParaRPr lang="pt-BR"/>
           </a:p>
@@ -1680,7 +1678,7 @@
     </p:spTree>
     <p:extLst>
       <p:ext uri="{BB962C8B-B14F-4D97-AF65-F5344CB8AC3E}">
-        <p14:creationId xmlns="" xmlns:p14="http://schemas.microsoft.com/office/powerpoint/2010/main" val="3558290181"/>
+        <p14:creationId xmlns:p14="http://schemas.microsoft.com/office/powerpoint/2010/main" xmlns="" val="3558290181"/>
       </p:ext>
     </p:extLst>
   </p:cSld>
@@ -1748,7 +1746,7 @@
             <a:fld id="{350D53EE-327D-4A72-B4C2-A5BEA245225D}" type="datetimeFigureOut">
               <a:rPr lang="pt-BR" smtClean="0"/>
               <a:pPr/>
-              <a:t>16/10/2017</a:t>
+              <a:t>13/11/2017</a:t>
             </a:fld>
             <a:endParaRPr lang="pt-BR"/>
           </a:p>
@@ -1800,7 +1798,7 @@
     </p:spTree>
     <p:extLst>
       <p:ext uri="{BB962C8B-B14F-4D97-AF65-F5344CB8AC3E}">
-        <p14:creationId xmlns="" xmlns:p14="http://schemas.microsoft.com/office/powerpoint/2010/main" val="485287703"/>
+        <p14:creationId xmlns:p14="http://schemas.microsoft.com/office/powerpoint/2010/main" xmlns="" val="485287703"/>
       </p:ext>
     </p:extLst>
   </p:cSld>
@@ -1845,7 +1843,7 @@
             <a:fld id="{350D53EE-327D-4A72-B4C2-A5BEA245225D}" type="datetimeFigureOut">
               <a:rPr lang="pt-BR" smtClean="0"/>
               <a:pPr/>
-              <a:t>16/10/2017</a:t>
+              <a:t>13/11/2017</a:t>
             </a:fld>
             <a:endParaRPr lang="pt-BR"/>
           </a:p>
@@ -1897,7 +1895,7 @@
     </p:spTree>
     <p:extLst>
       <p:ext uri="{BB962C8B-B14F-4D97-AF65-F5344CB8AC3E}">
-        <p14:creationId xmlns="" xmlns:p14="http://schemas.microsoft.com/office/powerpoint/2010/main" val="2480954880"/>
+        <p14:creationId xmlns:p14="http://schemas.microsoft.com/office/powerpoint/2010/main" xmlns="" val="2480954880"/>
       </p:ext>
     </p:extLst>
   </p:cSld>
@@ -2124,7 +2122,7 @@
             <a:fld id="{350D53EE-327D-4A72-B4C2-A5BEA245225D}" type="datetimeFigureOut">
               <a:rPr lang="pt-BR" smtClean="0"/>
               <a:pPr/>
-              <a:t>16/10/2017</a:t>
+              <a:t>13/11/2017</a:t>
             </a:fld>
             <a:endParaRPr lang="pt-BR"/>
           </a:p>
@@ -2176,7 +2174,7 @@
     </p:spTree>
     <p:extLst>
       <p:ext uri="{BB962C8B-B14F-4D97-AF65-F5344CB8AC3E}">
-        <p14:creationId xmlns="" xmlns:p14="http://schemas.microsoft.com/office/powerpoint/2010/main" val="552726866"/>
+        <p14:creationId xmlns:p14="http://schemas.microsoft.com/office/powerpoint/2010/main" xmlns="" val="552726866"/>
       </p:ext>
     </p:extLst>
   </p:cSld>
@@ -2379,7 +2377,7 @@
             <a:fld id="{350D53EE-327D-4A72-B4C2-A5BEA245225D}" type="datetimeFigureOut">
               <a:rPr lang="pt-BR" smtClean="0"/>
               <a:pPr/>
-              <a:t>16/10/2017</a:t>
+              <a:t>13/11/2017</a:t>
             </a:fld>
             <a:endParaRPr lang="pt-BR"/>
           </a:p>
@@ -2431,7 +2429,7 @@
     </p:spTree>
     <p:extLst>
       <p:ext uri="{BB962C8B-B14F-4D97-AF65-F5344CB8AC3E}">
-        <p14:creationId xmlns="" xmlns:p14="http://schemas.microsoft.com/office/powerpoint/2010/main" val="2255416836"/>
+        <p14:creationId xmlns:p14="http://schemas.microsoft.com/office/powerpoint/2010/main" xmlns="" val="2255416836"/>
       </p:ext>
     </p:extLst>
   </p:cSld>
@@ -2597,7 +2595,7 @@
             <a:fld id="{350D53EE-327D-4A72-B4C2-A5BEA245225D}" type="datetimeFigureOut">
               <a:rPr lang="pt-BR" smtClean="0"/>
               <a:pPr/>
-              <a:t>16/10/2017</a:t>
+              <a:t>13/11/2017</a:t>
             </a:fld>
             <a:endParaRPr lang="pt-BR"/>
           </a:p>
@@ -2685,7 +2683,7 @@
     </p:spTree>
     <p:extLst>
       <p:ext uri="{BB962C8B-B14F-4D97-AF65-F5344CB8AC3E}">
-        <p14:creationId xmlns="" xmlns:p14="http://schemas.microsoft.com/office/powerpoint/2010/main" val="3810791852"/>
+        <p14:creationId xmlns:p14="http://schemas.microsoft.com/office/powerpoint/2010/main" xmlns="" val="3810791852"/>
       </p:ext>
     </p:extLst>
   </p:cSld>
@@ -3030,7 +3028,7 @@
                 </a:solidFill>
                 <a:latin typeface="Chaparral Pro" panose="02060503040505020203" pitchFamily="18" charset="0"/>
               </a:rPr>
-              <a:t>Relatório de Combate</a:t>
+              <a:t>Workshop de PCB</a:t>
             </a:r>
             <a:endParaRPr lang="pt-BR" dirty="0">
               <a:solidFill>
@@ -3061,15 +3059,6 @@
           <a:bodyPr/>
           <a:lstStyle/>
           <a:p>
-            <a:r>
-              <a:rPr lang="pt-BR" dirty="0" smtClean="0">
-                <a:solidFill>
-                  <a:srgbClr val="FFC000"/>
-                </a:solidFill>
-                <a:latin typeface="Chaparral Pro" panose="02060503040505020203" pitchFamily="18" charset="0"/>
-              </a:rPr>
-              <a:t>Ponto de Controle 2</a:t>
-            </a:r>
             <a:endParaRPr lang="pt-BR" dirty="0">
               <a:solidFill>
                 <a:srgbClr val="FFC000"/>
@@ -3091,7 +3080,7 @@
           <a:blip r:embed="rId2" cstate="print">
             <a:extLst>
               <a:ext uri="{28A0092B-C50C-407E-A947-70E740481C1C}">
-                <a14:useLocalDpi xmlns="" xmlns:a14="http://schemas.microsoft.com/office/drawing/2010/main" val="0"/>
+                <a14:useLocalDpi xmlns:a14="http://schemas.microsoft.com/office/drawing/2010/main" xmlns="" val="0"/>
               </a:ext>
             </a:extLst>
           </a:blip>
@@ -3112,7 +3101,7 @@
     </p:spTree>
     <p:extLst>
       <p:ext uri="{BB962C8B-B14F-4D97-AF65-F5344CB8AC3E}">
-        <p14:creationId xmlns="" xmlns:p14="http://schemas.microsoft.com/office/powerpoint/2010/main" val="2951073917"/>
+        <p14:creationId xmlns:p14="http://schemas.microsoft.com/office/powerpoint/2010/main" xmlns="" val="2951073917"/>
       </p:ext>
     </p:extLst>
   </p:cSld>
@@ -3171,29 +3160,6 @@
       </p:sp>
       <p:pic>
         <p:nvPicPr>
-          <p:cNvPr id="5" name="Espaço Reservado para Conteúdo 4" descr="Imagem1.png"/>
-          <p:cNvPicPr>
-            <a:picLocks noGrp="1" noChangeAspect="1"/>
-          </p:cNvPicPr>
-          <p:nvPr>
-            <p:ph idx="1"/>
-          </p:nvPr>
-        </p:nvPicPr>
-        <p:blipFill>
-          <a:blip r:embed="rId2"/>
-          <a:stretch>
-            <a:fillRect/>
-          </a:stretch>
-        </p:blipFill>
-        <p:spPr>
-          <a:xfrm>
-            <a:off x="2966225" y="1727646"/>
-            <a:ext cx="6124678" cy="4449317"/>
-          </a:xfrm>
-        </p:spPr>
-      </p:pic>
-      <p:pic>
-        <p:nvPicPr>
           <p:cNvPr id="6" name="Picture 3"/>
           <p:cNvPicPr>
             <a:picLocks noChangeAspect="1"/>
@@ -3201,10 +3167,10 @@
           <p:nvPr/>
         </p:nvPicPr>
         <p:blipFill>
-          <a:blip r:embed="rId3" cstate="print">
+          <a:blip r:embed="rId2" cstate="print">
             <a:extLst>
               <a:ext uri="{28A0092B-C50C-407E-A947-70E740481C1C}">
-                <a14:useLocalDpi xmlns="" xmlns:a14="http://schemas.microsoft.com/office/drawing/2010/main" val="0"/>
+                <a14:useLocalDpi xmlns:a14="http://schemas.microsoft.com/office/drawing/2010/main" xmlns="" val="0"/>
               </a:ext>
             </a:extLst>
           </a:blip>
@@ -3263,55 +3229,15 @@
               <a:defRPr/>
             </a:pPr>
             <a:r>
-              <a:rPr kumimoji="0" lang="pt-BR" sz="4400" b="0" i="0" u="none" strike="noStrike" kern="1200" cap="none" spc="0" normalizeH="0" baseline="0" noProof="0" dirty="0" smtClean="0">
-                <a:ln>
-                  <a:noFill/>
-                </a:ln>
+              <a:rPr lang="pt-BR" sz="4400" dirty="0" smtClean="0">
                 <a:solidFill>
                   <a:srgbClr val="FFC000"/>
                 </a:solidFill>
-                <a:effectLst/>
-                <a:uLnTx/>
-                <a:uFillTx/>
                 <a:latin typeface="Chaparral Pro" panose="02060503040505020203" pitchFamily="18" charset="0"/>
                 <a:ea typeface="+mj-ea"/>
                 <a:cs typeface="+mj-cs"/>
               </a:rPr>
-              <a:t>Vertical</a:t>
-            </a:r>
-            <a:r>
-              <a:rPr kumimoji="0" lang="pt-BR" sz="4400" b="0" i="0" u="none" strike="noStrike" kern="1200" cap="none" spc="0" normalizeH="0" noProof="0" dirty="0" smtClean="0">
-                <a:ln>
-                  <a:noFill/>
-                </a:ln>
-                <a:solidFill>
-                  <a:srgbClr val="FFC000"/>
-                </a:solidFill>
-                <a:effectLst/>
-                <a:uLnTx/>
-                <a:uFillTx/>
-                <a:latin typeface="Chaparral Pro" panose="02060503040505020203" pitchFamily="18" charset="0"/>
-                <a:ea typeface="+mj-ea"/>
-                <a:cs typeface="+mj-cs"/>
-              </a:rPr>
-              <a:t> </a:t>
-            </a:r>
-            <a:r>
-              <a:rPr kumimoji="0" lang="pt-BR" sz="4400" b="0" i="0" u="none" strike="noStrike" kern="1200" cap="none" spc="0" normalizeH="0" noProof="0" dirty="0" err="1" smtClean="0">
-                <a:ln>
-                  <a:noFill/>
-                </a:ln>
-                <a:solidFill>
-                  <a:srgbClr val="FFC000"/>
-                </a:solidFill>
-                <a:effectLst/>
-                <a:uLnTx/>
-                <a:uFillTx/>
-                <a:latin typeface="Chaparral Pro" panose="02060503040505020203" pitchFamily="18" charset="0"/>
-                <a:ea typeface="+mj-ea"/>
-                <a:cs typeface="+mj-cs"/>
-              </a:rPr>
-              <a:t>Spinner</a:t>
+              <a:t>Introdução</a:t>
             </a:r>
             <a:endParaRPr kumimoji="0" lang="pt-BR" sz="4400" b="0" i="0" u="none" strike="noStrike" kern="1200" cap="none" spc="0" normalizeH="0" baseline="0" noProof="0" dirty="0">
               <a:ln>
@@ -3327,6 +3253,53 @@
               <a:ea typeface="+mj-ea"/>
               <a:cs typeface="+mj-cs"/>
             </a:endParaRPr>
+          </a:p>
+        </p:txBody>
+      </p:sp>
+      <p:sp>
+        <p:nvSpPr>
+          <p:cNvPr id="7" name="Espaço Reservado para Conteúdo 6"/>
+          <p:cNvSpPr>
+            <a:spLocks noGrp="1"/>
+          </p:cNvSpPr>
+          <p:nvPr>
+            <p:ph idx="1"/>
+          </p:nvPr>
+        </p:nvSpPr>
+        <p:spPr/>
+        <p:txBody>
+          <a:bodyPr/>
+          <a:lstStyle/>
+          <a:p>
+            <a:pPr algn="just"/>
+            <a:r>
+              <a:rPr lang="pt-BR" dirty="0" smtClean="0">
+                <a:solidFill>
+                  <a:srgbClr val="FFC000"/>
+                </a:solidFill>
+                <a:latin typeface="Chaparral Pro" panose="02060503040505020203" pitchFamily="18" charset="0"/>
+              </a:rPr>
+              <a:t> Um dos estágios finais de concepção de um produto eletrônico é o projeto dos circuitos a partir de placas de circuito impresso.</a:t>
+            </a:r>
+            <a:r>
+              <a:rPr lang="pt-BR" dirty="0" smtClean="0">
+                <a:solidFill>
+                  <a:srgbClr val="FFC000"/>
+                </a:solidFill>
+                <a:latin typeface="Chaparral Pro" panose="02060503040505020203" pitchFamily="18" charset="0"/>
+              </a:rPr>
+              <a:t> </a:t>
+            </a:r>
+            <a:r>
+              <a:rPr lang="pt-BR" dirty="0" smtClean="0">
+                <a:solidFill>
+                  <a:srgbClr val="FFC000"/>
+                </a:solidFill>
+                <a:latin typeface="Chaparral Pro" panose="02060503040505020203" pitchFamily="18" charset="0"/>
+              </a:rPr>
+              <a:t> </a:t>
+            </a:r>
+            <a:endParaRPr lang="pt-BR" dirty="0"/>
           </a:p>
         </p:txBody>
       </p:sp>
@@ -3470,7 +3443,25 @@
                 </a:solidFill>
                 <a:latin typeface="Chaparral Pro" panose="02060503040505020203" pitchFamily="18" charset="0"/>
               </a:rPr>
-              <a:t> Realizar simulações  dinâmicas e estáticas de esforços  mecânicos</a:t>
+              <a:t> Realizar simulações  </a:t>
+            </a:r>
+            <a:r>
+              <a:rPr lang="pt-BR" dirty="0" smtClean="0">
+                <a:solidFill>
+                  <a:srgbClr val="FFC000"/>
+                </a:solidFill>
+                <a:latin typeface="Chaparral Pro" panose="02060503040505020203" pitchFamily="18" charset="0"/>
+              </a:rPr>
+              <a:t>dinâmicas e </a:t>
+            </a:r>
+            <a:r>
+              <a:rPr lang="pt-BR" dirty="0" smtClean="0">
+                <a:solidFill>
+                  <a:srgbClr val="FFC000"/>
+                </a:solidFill>
+                <a:latin typeface="Chaparral Pro" panose="02060503040505020203" pitchFamily="18" charset="0"/>
+              </a:rPr>
+              <a:t>estáticas de esforços  mecânicos</a:t>
             </a:r>
             <a:endParaRPr lang="pt-BR" dirty="0">
               <a:solidFill>
@@ -3604,7 +3595,7 @@
           <a:blip r:embed="rId2" cstate="print">
             <a:extLst>
               <a:ext uri="{28A0092B-C50C-407E-A947-70E740481C1C}">
-                <a14:useLocalDpi xmlns="" xmlns:a14="http://schemas.microsoft.com/office/drawing/2010/main" val="0"/>
+                <a14:useLocalDpi xmlns:a14="http://schemas.microsoft.com/office/drawing/2010/main" xmlns="" val="0"/>
               </a:ext>
             </a:extLst>
           </a:blip>
@@ -3625,7 +3616,7 @@
     </p:spTree>
     <p:extLst>
       <p:ext uri="{BB962C8B-B14F-4D97-AF65-F5344CB8AC3E}">
-        <p14:creationId xmlns="" xmlns:p14="http://schemas.microsoft.com/office/powerpoint/2010/main" val="2926665099"/>
+        <p14:creationId xmlns:p14="http://schemas.microsoft.com/office/powerpoint/2010/main" xmlns="" val="2926665099"/>
       </p:ext>
     </p:extLst>
   </p:cSld>
@@ -3898,7 +3889,7 @@
           <a:blip r:embed="rId2" cstate="print">
             <a:extLst>
               <a:ext uri="{28A0092B-C50C-407E-A947-70E740481C1C}">
-                <a14:useLocalDpi xmlns="" xmlns:a14="http://schemas.microsoft.com/office/drawing/2010/main" val="0"/>
+                <a14:useLocalDpi xmlns:a14="http://schemas.microsoft.com/office/drawing/2010/main" xmlns="" val="0"/>
               </a:ext>
             </a:extLst>
           </a:blip>
@@ -3919,7 +3910,7 @@
     </p:spTree>
     <p:extLst>
       <p:ext uri="{BB962C8B-B14F-4D97-AF65-F5344CB8AC3E}">
-        <p14:creationId xmlns="" xmlns:p14="http://schemas.microsoft.com/office/powerpoint/2010/main" val="1742585887"/>
+        <p14:creationId xmlns:p14="http://schemas.microsoft.com/office/powerpoint/2010/main" xmlns="" val="1742585887"/>
       </p:ext>
     </p:extLst>
   </p:cSld>
@@ -4106,7 +4097,7 @@
           <a:blip r:embed="rId2" cstate="print">
             <a:extLst>
               <a:ext uri="{28A0092B-C50C-407E-A947-70E740481C1C}">
-                <a14:useLocalDpi xmlns="" xmlns:a14="http://schemas.microsoft.com/office/drawing/2010/main" val="0"/>
+                <a14:useLocalDpi xmlns:a14="http://schemas.microsoft.com/office/drawing/2010/main" xmlns="" val="0"/>
               </a:ext>
             </a:extLst>
           </a:blip>
@@ -4224,7 +4215,7 @@
     </p:spTree>
     <p:extLst>
       <p:ext uri="{BB962C8B-B14F-4D97-AF65-F5344CB8AC3E}">
-        <p14:creationId xmlns="" xmlns:p14="http://schemas.microsoft.com/office/powerpoint/2010/main" val="2798976986"/>
+        <p14:creationId xmlns:p14="http://schemas.microsoft.com/office/powerpoint/2010/main" xmlns="" val="2798976986"/>
       </p:ext>
     </p:extLst>
   </p:cSld>
@@ -4265,274 +4256,6 @@
             <a:spLocks noGrp="1"/>
           </p:cNvSpPr>
           <p:nvPr>
-            <p:ph type="title"/>
-          </p:nvPr>
-        </p:nvSpPr>
-        <p:spPr/>
-        <p:txBody>
-          <a:bodyPr/>
-          <a:lstStyle/>
-          <a:p>
-            <a:r>
-              <a:rPr lang="pt-BR" dirty="0" smtClean="0">
-                <a:solidFill>
-                  <a:srgbClr val="FFC000"/>
-                </a:solidFill>
-                <a:latin typeface="Chaparral Pro" panose="02060503040505020203" pitchFamily="18" charset="0"/>
-              </a:rPr>
-              <a:t>Resultados</a:t>
-            </a:r>
-            <a:endParaRPr lang="pt-BR" dirty="0">
-              <a:solidFill>
-                <a:srgbClr val="FFC000"/>
-              </a:solidFill>
-              <a:latin typeface="Chaparral Pro" panose="02060503040505020203" pitchFamily="18" charset="0"/>
-            </a:endParaRPr>
-          </a:p>
-        </p:txBody>
-      </p:sp>
-      <p:pic>
-        <p:nvPicPr>
-          <p:cNvPr id="6" name="Espaço Reservado para Conteúdo 5" descr="WhatsApp Image 2017-10-16 at 10.55.41 AM.jpeg"/>
-          <p:cNvPicPr>
-            <a:picLocks noGrp="1" noChangeAspect="1"/>
-          </p:cNvPicPr>
-          <p:nvPr>
-            <p:ph idx="1"/>
-          </p:nvPr>
-        </p:nvPicPr>
-        <p:blipFill>
-          <a:blip r:embed="rId2"/>
-          <a:stretch>
-            <a:fillRect/>
-          </a:stretch>
-        </p:blipFill>
-        <p:spPr>
-          <a:xfrm rot="16200000">
-            <a:off x="6841688" y="3207807"/>
-            <a:ext cx="2824827" cy="3766435"/>
-          </a:xfrm>
-        </p:spPr>
-      </p:pic>
-      <p:pic>
-        <p:nvPicPr>
-          <p:cNvPr id="8" name="Imagem 7" descr="WhatsApp Image 2017-10-16 at 10.55.42 AM (1).jpeg"/>
-          <p:cNvPicPr>
-            <a:picLocks noChangeAspect="1"/>
-          </p:cNvPicPr>
-          <p:nvPr/>
-        </p:nvPicPr>
-        <p:blipFill>
-          <a:blip r:embed="rId3"/>
-          <a:srcRect l="11317" t="-335" r="21363"/>
-          <a:stretch>
-            <a:fillRect/>
-          </a:stretch>
-        </p:blipFill>
-        <p:spPr>
-          <a:xfrm>
-            <a:off x="561702" y="2142308"/>
-            <a:ext cx="4554370" cy="3818249"/>
-          </a:xfrm>
-          <a:prstGeom prst="rect">
-            <a:avLst/>
-          </a:prstGeom>
-        </p:spPr>
-      </p:pic>
-      <p:pic>
-        <p:nvPicPr>
-          <p:cNvPr id="1026" name="Picture 2"/>
-          <p:cNvPicPr>
-            <a:picLocks noChangeAspect="1" noChangeArrowheads="1"/>
-          </p:cNvPicPr>
-          <p:nvPr/>
-        </p:nvPicPr>
-        <p:blipFill>
-          <a:blip r:embed="rId4"/>
-          <a:srcRect/>
-          <a:stretch>
-            <a:fillRect/>
-          </a:stretch>
-        </p:blipFill>
-        <p:spPr bwMode="auto">
-          <a:xfrm>
-            <a:off x="6075726" y="496389"/>
-            <a:ext cx="4291314" cy="2936421"/>
-          </a:xfrm>
-          <a:prstGeom prst="rect">
-            <a:avLst/>
-          </a:prstGeom>
-          <a:noFill/>
-          <a:ln w="9525">
-            <a:noFill/>
-            <a:miter lim="800000"/>
-            <a:headEnd/>
-            <a:tailEnd/>
-          </a:ln>
-          <a:effectLst/>
-        </p:spPr>
-      </p:pic>
-    </p:spTree>
-    <p:extLst>
-      <p:ext uri="{BB962C8B-B14F-4D97-AF65-F5344CB8AC3E}">
-        <p14:creationId xmlns="" xmlns:p14="http://schemas.microsoft.com/office/powerpoint/2010/main" val="4031246211"/>
-      </p:ext>
-    </p:extLst>
-  </p:cSld>
-  <p:clrMapOvr>
-    <a:masterClrMapping/>
-  </p:clrMapOvr>
-  <p:timing>
-    <p:tnLst>
-      <p:par>
-        <p:cTn id="1" dur="indefinite" restart="never" nodeType="tmRoot"/>
-      </p:par>
-    </p:tnLst>
-  </p:timing>
-</p:sld>
-</file>
-
-<file path=ppt/slides/slide7.xml><?xml version="1.0" encoding="utf-8"?>
-<p:sld xmlns:a="http://schemas.openxmlformats.org/drawingml/2006/main" xmlns:r="http://schemas.openxmlformats.org/officeDocument/2006/relationships" xmlns:p="http://schemas.openxmlformats.org/presentationml/2006/main">
-  <p:cSld>
-    <p:spTree>
-      <p:nvGrpSpPr>
-        <p:cNvPr id="1" name=""/>
-        <p:cNvGrpSpPr/>
-        <p:nvPr/>
-      </p:nvGrpSpPr>
-      <p:grpSpPr>
-        <a:xfrm>
-          <a:off x="0" y="0"/>
-          <a:ext cx="0" cy="0"/>
-          <a:chOff x="0" y="0"/>
-          <a:chExt cx="0" cy="0"/>
-        </a:xfrm>
-      </p:grpSpPr>
-      <p:sp>
-        <p:nvSpPr>
-          <p:cNvPr id="3" name="Espaço Reservado para Conteúdo 2"/>
-          <p:cNvSpPr>
-            <a:spLocks noGrp="1"/>
-          </p:cNvSpPr>
-          <p:nvPr>
-            <p:ph idx="1"/>
-          </p:nvPr>
-        </p:nvSpPr>
-        <p:spPr/>
-        <p:txBody>
-          <a:bodyPr/>
-          <a:lstStyle/>
-          <a:p>
-            <a:endParaRPr lang="pt-BR" dirty="0"/>
-          </a:p>
-        </p:txBody>
-      </p:sp>
-      <p:sp>
-        <p:nvSpPr>
-          <p:cNvPr id="5" name="Title 1"/>
-          <p:cNvSpPr>
-            <a:spLocks noGrp="1"/>
-          </p:cNvSpPr>
-          <p:nvPr>
-            <p:ph type="title"/>
-          </p:nvPr>
-        </p:nvSpPr>
-        <p:spPr/>
-        <p:txBody>
-          <a:bodyPr/>
-          <a:lstStyle/>
-          <a:p>
-            <a:r>
-              <a:rPr lang="pt-BR" dirty="0" smtClean="0">
-                <a:solidFill>
-                  <a:srgbClr val="FFC000"/>
-                </a:solidFill>
-                <a:latin typeface="Chaparral Pro" panose="02060503040505020203" pitchFamily="18" charset="0"/>
-              </a:rPr>
-              <a:t>Nova arma</a:t>
-            </a:r>
-            <a:endParaRPr lang="pt-BR" dirty="0">
-              <a:solidFill>
-                <a:srgbClr val="FFC000"/>
-              </a:solidFill>
-              <a:latin typeface="Chaparral Pro" panose="02060503040505020203" pitchFamily="18" charset="0"/>
-            </a:endParaRPr>
-          </a:p>
-        </p:txBody>
-      </p:sp>
-      <p:pic>
-        <p:nvPicPr>
-          <p:cNvPr id="1027" name="Picture 3"/>
-          <p:cNvPicPr>
-            <a:picLocks noChangeAspect="1" noChangeArrowheads="1"/>
-          </p:cNvPicPr>
-          <p:nvPr/>
-        </p:nvPicPr>
-        <p:blipFill>
-          <a:blip r:embed="rId2"/>
-          <a:srcRect/>
-          <a:stretch>
-            <a:fillRect/>
-          </a:stretch>
-        </p:blipFill>
-        <p:spPr bwMode="auto">
-          <a:xfrm>
-            <a:off x="2677885" y="1540056"/>
-            <a:ext cx="6157641" cy="4827136"/>
-          </a:xfrm>
-          <a:prstGeom prst="rect">
-            <a:avLst/>
-          </a:prstGeom>
-          <a:noFill/>
-          <a:ln w="9525">
-            <a:noFill/>
-            <a:miter lim="800000"/>
-            <a:headEnd/>
-            <a:tailEnd/>
-          </a:ln>
-          <a:effectLst/>
-        </p:spPr>
-      </p:pic>
-    </p:spTree>
-  </p:cSld>
-  <p:clrMapOvr>
-    <a:masterClrMapping/>
-  </p:clrMapOvr>
-  <p:timing>
-    <p:tnLst>
-      <p:par>
-        <p:cTn id="1" dur="indefinite" restart="never" nodeType="tmRoot"/>
-      </p:par>
-    </p:tnLst>
-  </p:timing>
-</p:sld>
-</file>
-
-<file path=ppt/slides/slide8.xml><?xml version="1.0" encoding="utf-8"?>
-<p:sld xmlns:a="http://schemas.openxmlformats.org/drawingml/2006/main" xmlns:r="http://schemas.openxmlformats.org/officeDocument/2006/relationships" xmlns:p="http://schemas.openxmlformats.org/presentationml/2006/main">
-  <p:cSld>
-    <p:spTree>
-      <p:nvGrpSpPr>
-        <p:cNvPr id="1" name=""/>
-        <p:cNvGrpSpPr/>
-        <p:nvPr/>
-      </p:nvGrpSpPr>
-      <p:grpSpPr>
-        <a:xfrm>
-          <a:off x="0" y="0"/>
-          <a:ext cx="0" cy="0"/>
-          <a:chOff x="0" y="0"/>
-          <a:chExt cx="0" cy="0"/>
-        </a:xfrm>
-      </p:grpSpPr>
-      <p:sp>
-        <p:nvSpPr>
-          <p:cNvPr id="2" name="Title 1"/>
-          <p:cNvSpPr>
-            <a:spLocks noGrp="1"/>
-          </p:cNvSpPr>
-          <p:nvPr>
             <p:ph type="ctrTitle"/>
           </p:nvPr>
         </p:nvSpPr>
@@ -4614,7 +4337,7 @@
           <a:blip r:embed="rId2" cstate="print">
             <a:extLst>
               <a:ext uri="{28A0092B-C50C-407E-A947-70E740481C1C}">
-                <a14:useLocalDpi xmlns="" xmlns:a14="http://schemas.microsoft.com/office/drawing/2010/main" val="0"/>
+                <a14:useLocalDpi xmlns:a14="http://schemas.microsoft.com/office/drawing/2010/main" xmlns="" val="0"/>
               </a:ext>
             </a:extLst>
           </a:blip>
@@ -4635,7 +4358,7 @@
     </p:spTree>
     <p:extLst>
       <p:ext uri="{BB962C8B-B14F-4D97-AF65-F5344CB8AC3E}">
-        <p14:creationId xmlns="" xmlns:p14="http://schemas.microsoft.com/office/powerpoint/2010/main" val="3044567518"/>
+        <p14:creationId xmlns:p14="http://schemas.microsoft.com/office/powerpoint/2010/main" xmlns="" val="3044567518"/>
       </p:ext>
     </p:extLst>
   </p:cSld>
@@ -4907,7 +4630,7 @@
   <a:extraClrSchemeLst/>
   <a:extLst>
     <a:ext uri="{05A4C25C-085E-4340-85A3-A5531E510DB2}">
-      <thm15:themeFamily xmlns="" xmlns:thm15="http://schemas.microsoft.com/office/thememl/2012/main" name="Office Theme" id="{62F939B6-93AF-4DB8-9C6B-D6C7DFDC589F}" vid="{4A3C46E8-61CC-4603-A589-7422A47A8E4A}"/>
+      <thm15:themeFamily xmlns:thm15="http://schemas.microsoft.com/office/thememl/2012/main" xmlns="" name="Office Theme" id="{62F939B6-93AF-4DB8-9C6B-D6C7DFDC589F}" vid="{4A3C46E8-61CC-4603-A589-7422A47A8E4A}"/>
     </a:ext>
   </a:extLst>
 </a:theme>

</xml_diff>